<commit_message>
Remove chronology that came w/ extra coauthor
@teixeirak can you remake this figure? I realized I left in a chrono which would have required another coauthor
</commit_message>
<xml_diff>
--- a/doc/manuscript/tables_figures/tree_rings_figs.pptx
+++ b/doc/manuscript/tables_figures/tree_rings_figs.pptx
@@ -198,7 +198,7 @@
           <a:p>
             <a:fld id="{F70F5402-B2D4-AF48-9284-8FD064B6E26D}" type="datetimeFigureOut">
               <a:rPr lang="en-US" smtClean="0"/>
-              <a:t>9/20/21</a:t>
+              <a:t>10/15/2021</a:t>
             </a:fld>
             <a:endParaRPr lang="en-US"/>
           </a:p>
@@ -684,7 +684,7 @@
           <a:p>
             <a:fld id="{7323833B-5180-444D-893E-57F1CEBFA0E4}" type="datetimeFigureOut">
               <a:rPr lang="en-US" smtClean="0"/>
-              <a:t>9/20/21</a:t>
+              <a:t>10/15/2021</a:t>
             </a:fld>
             <a:endParaRPr lang="en-US"/>
           </a:p>
@@ -854,7 +854,7 @@
           <a:p>
             <a:fld id="{7323833B-5180-444D-893E-57F1CEBFA0E4}" type="datetimeFigureOut">
               <a:rPr lang="en-US" smtClean="0"/>
-              <a:t>9/20/21</a:t>
+              <a:t>10/15/2021</a:t>
             </a:fld>
             <a:endParaRPr lang="en-US"/>
           </a:p>
@@ -1034,7 +1034,7 @@
           <a:p>
             <a:fld id="{7323833B-5180-444D-893E-57F1CEBFA0E4}" type="datetimeFigureOut">
               <a:rPr lang="en-US" smtClean="0"/>
-              <a:t>9/20/21</a:t>
+              <a:t>10/15/2021</a:t>
             </a:fld>
             <a:endParaRPr lang="en-US"/>
           </a:p>
@@ -1204,7 +1204,7 @@
           <a:p>
             <a:fld id="{7323833B-5180-444D-893E-57F1CEBFA0E4}" type="datetimeFigureOut">
               <a:rPr lang="en-US" smtClean="0"/>
-              <a:t>9/20/21</a:t>
+              <a:t>10/15/2021</a:t>
             </a:fld>
             <a:endParaRPr lang="en-US"/>
           </a:p>
@@ -1448,7 +1448,7 @@
           <a:p>
             <a:fld id="{7323833B-5180-444D-893E-57F1CEBFA0E4}" type="datetimeFigureOut">
               <a:rPr lang="en-US" smtClean="0"/>
-              <a:t>9/20/21</a:t>
+              <a:t>10/15/2021</a:t>
             </a:fld>
             <a:endParaRPr lang="en-US"/>
           </a:p>
@@ -1680,7 +1680,7 @@
           <a:p>
             <a:fld id="{7323833B-5180-444D-893E-57F1CEBFA0E4}" type="datetimeFigureOut">
               <a:rPr lang="en-US" smtClean="0"/>
-              <a:t>9/20/21</a:t>
+              <a:t>10/15/2021</a:t>
             </a:fld>
             <a:endParaRPr lang="en-US"/>
           </a:p>
@@ -2047,7 +2047,7 @@
           <a:p>
             <a:fld id="{7323833B-5180-444D-893E-57F1CEBFA0E4}" type="datetimeFigureOut">
               <a:rPr lang="en-US" smtClean="0"/>
-              <a:t>9/20/21</a:t>
+              <a:t>10/15/2021</a:t>
             </a:fld>
             <a:endParaRPr lang="en-US"/>
           </a:p>
@@ -2165,7 +2165,7 @@
           <a:p>
             <a:fld id="{7323833B-5180-444D-893E-57F1CEBFA0E4}" type="datetimeFigureOut">
               <a:rPr lang="en-US" smtClean="0"/>
-              <a:t>9/20/21</a:t>
+              <a:t>10/15/2021</a:t>
             </a:fld>
             <a:endParaRPr lang="en-US"/>
           </a:p>
@@ -2260,7 +2260,7 @@
           <a:p>
             <a:fld id="{7323833B-5180-444D-893E-57F1CEBFA0E4}" type="datetimeFigureOut">
               <a:rPr lang="en-US" smtClean="0"/>
-              <a:t>9/20/21</a:t>
+              <a:t>10/15/2021</a:t>
             </a:fld>
             <a:endParaRPr lang="en-US"/>
           </a:p>
@@ -2537,7 +2537,7 @@
           <a:p>
             <a:fld id="{7323833B-5180-444D-893E-57F1CEBFA0E4}" type="datetimeFigureOut">
               <a:rPr lang="en-US" smtClean="0"/>
-              <a:t>9/20/21</a:t>
+              <a:t>10/15/2021</a:t>
             </a:fld>
             <a:endParaRPr lang="en-US"/>
           </a:p>
@@ -2794,7 +2794,7 @@
           <a:p>
             <a:fld id="{7323833B-5180-444D-893E-57F1CEBFA0E4}" type="datetimeFigureOut">
               <a:rPr lang="en-US" smtClean="0"/>
-              <a:t>9/20/21</a:t>
+              <a:t>10/15/2021</a:t>
             </a:fld>
             <a:endParaRPr lang="en-US"/>
           </a:p>
@@ -3007,7 +3007,7 @@
           <a:p>
             <a:fld id="{7323833B-5180-444D-893E-57F1CEBFA0E4}" type="datetimeFigureOut">
               <a:rPr lang="en-US" smtClean="0"/>
-              <a:t>9/20/21</a:t>
+              <a:t>10/15/2021</a:t>
             </a:fld>
             <a:endParaRPr lang="en-US"/>
           </a:p>
@@ -3468,10 +3468,10 @@
       </p:sp>
       <p:pic>
         <p:nvPicPr>
-          <p:cNvPr id="12" name="Picture 11" descr="Chart&#10;&#10;Description automatically generated with medium confidence">
+          <p:cNvPr id="5" name="Picture 4">
             <a:extLst>
               <a:ext uri="{FF2B5EF4-FFF2-40B4-BE49-F238E27FC236}">
-                <a16:creationId xmlns:a16="http://schemas.microsoft.com/office/drawing/2014/main" id="{1E9AD601-D291-439C-8AC8-283E3699812A}"/>
+                <a16:creationId xmlns:a16="http://schemas.microsoft.com/office/drawing/2014/main" id="{73935DCE-02CD-4213-9C2B-C27FCABF6898}"/>
               </a:ext>
             </a:extLst>
           </p:cNvPr>
@@ -3482,13 +3482,13 @@
         </p:nvPicPr>
         <p:blipFill rotWithShape="1">
           <a:blip r:embed="rId2"/>
-          <a:srcRect l="1" r="18917"/>
+          <a:srcRect l="11174"/>
           <a:stretch/>
         </p:blipFill>
         <p:spPr>
           <a:xfrm>
-            <a:off x="730106" y="128032"/>
-            <a:ext cx="2706199" cy="6675120"/>
+            <a:off x="3621007" y="129785"/>
+            <a:ext cx="2964636" cy="6723603"/>
           </a:xfrm>
           <a:prstGeom prst="rect">
             <a:avLst/>
@@ -3497,10 +3497,10 @@
       </p:pic>
       <p:pic>
         <p:nvPicPr>
-          <p:cNvPr id="9" name="Picture 8" descr="Graphical user interface, application&#10;&#10;Description automatically generated">
+          <p:cNvPr id="4" name="Picture 3" descr="A picture containing graphical user interface&#10;&#10;Description automatically generated">
             <a:extLst>
               <a:ext uri="{FF2B5EF4-FFF2-40B4-BE49-F238E27FC236}">
-                <a16:creationId xmlns:a16="http://schemas.microsoft.com/office/drawing/2014/main" id="{0F8AB4F6-A775-44B0-8CF9-A55A46455721}"/>
+                <a16:creationId xmlns:a16="http://schemas.microsoft.com/office/drawing/2014/main" id="{AD3E9CCF-AA7C-4665-81E3-97F23BB565DD}"/>
               </a:ext>
             </a:extLst>
           </p:cNvPr>
@@ -3511,13 +3511,13 @@
         </p:nvPicPr>
         <p:blipFill rotWithShape="1">
           <a:blip r:embed="rId3"/>
-          <a:srcRect l="11129"/>
+          <a:srcRect l="12104" t="300" r="21330" b="226"/>
           <a:stretch/>
         </p:blipFill>
         <p:spPr>
           <a:xfrm>
-            <a:off x="3615961" y="105027"/>
-            <a:ext cx="2966120" cy="6675120"/>
+            <a:off x="1127235" y="146225"/>
+            <a:ext cx="2233389" cy="6675120"/>
           </a:xfrm>
           <a:prstGeom prst="rect">
             <a:avLst/>
@@ -3786,7 +3786,7 @@
         </p:nvSpPr>
         <p:spPr>
           <a:xfrm>
-            <a:off x="1334078" y="4838826"/>
+            <a:off x="1334078" y="4843406"/>
             <a:ext cx="1988516" cy="91949"/>
           </a:xfrm>
           <a:prstGeom prst="rect">
@@ -4092,7 +4092,7 @@
         </p:nvGrpSpPr>
         <p:grpSpPr>
           <a:xfrm>
-            <a:off x="3490156" y="4994396"/>
+            <a:off x="3503704" y="5065298"/>
             <a:ext cx="2337892" cy="680442"/>
             <a:chOff x="984703" y="4847806"/>
             <a:chExt cx="2337892" cy="361665"/>
@@ -4247,7 +4247,7 @@
         </p:nvGrpSpPr>
         <p:grpSpPr>
           <a:xfrm>
-            <a:off x="3497377" y="1306886"/>
+            <a:off x="3497377" y="1341603"/>
             <a:ext cx="2351421" cy="680442"/>
             <a:chOff x="971174" y="4885200"/>
             <a:chExt cx="2351421" cy="361665"/>
@@ -4498,12 +4498,686 @@
           <a:chExt cx="0" cy="0"/>
         </a:xfrm>
       </p:grpSpPr>
+      <p:sp>
+        <p:nvSpPr>
+          <p:cNvPr id="6" name="Rectangle 5">
+            <a:extLst>
+              <a:ext uri="{FF2B5EF4-FFF2-40B4-BE49-F238E27FC236}">
+                <a16:creationId xmlns:a16="http://schemas.microsoft.com/office/drawing/2014/main" id="{2827099A-799C-4D2C-AD9D-F9A8D8DA4D6D}"/>
+              </a:ext>
+            </a:extLst>
+          </p:cNvPr>
+          <p:cNvSpPr/>
+          <p:nvPr/>
+        </p:nvSpPr>
+        <p:spPr>
+          <a:xfrm>
+            <a:off x="-120977" y="59767"/>
+            <a:ext cx="7151427" cy="7937970"/>
+          </a:xfrm>
+          <a:prstGeom prst="rect">
+            <a:avLst/>
+          </a:prstGeom>
+          <a:solidFill>
+            <a:schemeClr val="bg1"/>
+          </a:solidFill>
+          <a:ln>
+            <a:solidFill>
+              <a:schemeClr val="bg1"/>
+            </a:solidFill>
+          </a:ln>
+        </p:spPr>
+        <p:style>
+          <a:lnRef idx="2">
+            <a:schemeClr val="accent1">
+              <a:shade val="50000"/>
+            </a:schemeClr>
+          </a:lnRef>
+          <a:fillRef idx="1">
+            <a:schemeClr val="accent1"/>
+          </a:fillRef>
+          <a:effectRef idx="0">
+            <a:schemeClr val="accent1"/>
+          </a:effectRef>
+          <a:fontRef idx="minor">
+            <a:schemeClr val="lt1"/>
+          </a:fontRef>
+        </p:style>
+        <p:txBody>
+          <a:bodyPr rtlCol="0" anchor="ctr"/>
+          <a:lstStyle/>
+          <a:p>
+            <a:pPr algn="ctr"/>
+            <a:endParaRPr lang="en-US"/>
+          </a:p>
+        </p:txBody>
+      </p:sp>
+      <p:pic>
+        <p:nvPicPr>
+          <p:cNvPr id="4" name="Picture 3" descr="Chart&#10;&#10;Description automatically generated">
+            <a:extLst>
+              <a:ext uri="{FF2B5EF4-FFF2-40B4-BE49-F238E27FC236}">
+                <a16:creationId xmlns:a16="http://schemas.microsoft.com/office/drawing/2014/main" id="{1D60A4B1-017F-4397-92EA-22C7D6266CA7}"/>
+              </a:ext>
+            </a:extLst>
+          </p:cNvPr>
+          <p:cNvPicPr>
+            <a:picLocks noChangeAspect="1"/>
+          </p:cNvPicPr>
+          <p:nvPr/>
+        </p:nvPicPr>
+        <p:blipFill rotWithShape="1">
+          <a:blip r:embed="rId3"/>
+          <a:srcRect l="12783" t="3545" r="20967" b="8122"/>
+          <a:stretch/>
+        </p:blipFill>
+        <p:spPr>
+          <a:xfrm>
+            <a:off x="879087" y="718133"/>
+            <a:ext cx="2304289" cy="6131984"/>
+          </a:xfrm>
+          <a:prstGeom prst="rect">
+            <a:avLst/>
+          </a:prstGeom>
+        </p:spPr>
+      </p:pic>
+      <p:pic>
+        <p:nvPicPr>
+          <p:cNvPr id="2" name="Picture 1">
+            <a:extLst>
+              <a:ext uri="{FF2B5EF4-FFF2-40B4-BE49-F238E27FC236}">
+                <a16:creationId xmlns:a16="http://schemas.microsoft.com/office/drawing/2014/main" id="{87DB3CF3-BB23-49EF-B6FB-6F71FE6B9BA0}"/>
+              </a:ext>
+            </a:extLst>
+          </p:cNvPr>
+          <p:cNvPicPr>
+            <a:picLocks noChangeAspect="1"/>
+          </p:cNvPicPr>
+          <p:nvPr/>
+        </p:nvPicPr>
+        <p:blipFill rotWithShape="1">
+          <a:blip r:embed="rId4"/>
+          <a:srcRect l="12192" t="3585" r="3657" b="7547"/>
+          <a:stretch/>
+        </p:blipFill>
+        <p:spPr>
+          <a:xfrm>
+            <a:off x="3400396" y="721213"/>
+            <a:ext cx="2909307" cy="6144768"/>
+          </a:xfrm>
+          <a:prstGeom prst="rect">
+            <a:avLst/>
+          </a:prstGeom>
+        </p:spPr>
+      </p:pic>
+      <p:sp>
+        <p:nvSpPr>
+          <p:cNvPr id="8" name="TextBox 7">
+            <a:extLst>
+              <a:ext uri="{FF2B5EF4-FFF2-40B4-BE49-F238E27FC236}">
+                <a16:creationId xmlns:a16="http://schemas.microsoft.com/office/drawing/2014/main" id="{B2960B18-C375-1844-B59E-B66AAF22394A}"/>
+              </a:ext>
+            </a:extLst>
+          </p:cNvPr>
+          <p:cNvSpPr txBox="1"/>
+          <p:nvPr/>
+        </p:nvSpPr>
+        <p:spPr>
+          <a:xfrm>
+            <a:off x="3532396" y="427058"/>
+            <a:ext cx="2238459" cy="246221"/>
+          </a:xfrm>
+          <a:prstGeom prst="rect">
+            <a:avLst/>
+          </a:prstGeom>
+          <a:solidFill>
+            <a:schemeClr val="bg1"/>
+          </a:solidFill>
+        </p:spPr>
+        <p:txBody>
+          <a:bodyPr wrap="square" rtlCol="0">
+            <a:spAutoFit/>
+          </a:bodyPr>
+          <a:lstStyle/>
+          <a:p>
+            <a:pPr algn="ctr"/>
+            <a:r>
+              <a:rPr lang="en-US" sz="1000" dirty="0">
+                <a:latin typeface="Helvetica" pitchFamily="2" charset="0"/>
+              </a:rPr>
+              <a:t>Diffuse porous</a:t>
+            </a:r>
+          </a:p>
+        </p:txBody>
+      </p:sp>
+      <p:sp>
+        <p:nvSpPr>
+          <p:cNvPr id="27" name="TextBox 26">
+            <a:extLst>
+              <a:ext uri="{FF2B5EF4-FFF2-40B4-BE49-F238E27FC236}">
+                <a16:creationId xmlns:a16="http://schemas.microsoft.com/office/drawing/2014/main" id="{B2491FE7-9723-CD46-9B89-7050774C27C9}"/>
+              </a:ext>
+            </a:extLst>
+          </p:cNvPr>
+          <p:cNvSpPr txBox="1"/>
+          <p:nvPr/>
+        </p:nvSpPr>
+        <p:spPr>
+          <a:xfrm rot="16200000">
+            <a:off x="-11890" y="3727558"/>
+            <a:ext cx="1403921" cy="246221"/>
+          </a:xfrm>
+          <a:prstGeom prst="rect">
+            <a:avLst/>
+          </a:prstGeom>
+          <a:noFill/>
+        </p:spPr>
+        <p:txBody>
+          <a:bodyPr wrap="square" rtlCol="0">
+            <a:spAutoFit/>
+          </a:bodyPr>
+          <a:lstStyle/>
+          <a:p>
+            <a:r>
+              <a:rPr lang="en-US" sz="1000" b="1" dirty="0">
+                <a:latin typeface="Helvetica" pitchFamily="2" charset="0"/>
+              </a:rPr>
+              <a:t>Chronology number</a:t>
+            </a:r>
+          </a:p>
+        </p:txBody>
+      </p:sp>
+      <p:sp>
+        <p:nvSpPr>
+          <p:cNvPr id="34" name="Down Arrow 33">
+            <a:extLst>
+              <a:ext uri="{FF2B5EF4-FFF2-40B4-BE49-F238E27FC236}">
+                <a16:creationId xmlns:a16="http://schemas.microsoft.com/office/drawing/2014/main" id="{F1B13D42-2553-8148-87B1-32BA355FB23F}"/>
+              </a:ext>
+            </a:extLst>
+          </p:cNvPr>
+          <p:cNvSpPr/>
+          <p:nvPr/>
+        </p:nvSpPr>
+        <p:spPr>
+          <a:xfrm rot="10800000">
+            <a:off x="204338" y="1216598"/>
+            <a:ext cx="362618" cy="5495925"/>
+          </a:xfrm>
+          <a:prstGeom prst="downArrow">
+            <a:avLst/>
+          </a:prstGeom>
+          <a:gradFill>
+            <a:gsLst>
+              <a:gs pos="0">
+                <a:schemeClr val="accent1">
+                  <a:lumMod val="40000"/>
+                  <a:lumOff val="60000"/>
+                </a:schemeClr>
+              </a:gs>
+              <a:gs pos="100000">
+                <a:srgbClr val="C00000"/>
+              </a:gs>
+            </a:gsLst>
+            <a:lin ang="5400000" scaled="1"/>
+          </a:gradFill>
+          <a:ln>
+            <a:solidFill>
+              <a:schemeClr val="tx1"/>
+            </a:solidFill>
+          </a:ln>
+        </p:spPr>
+        <p:style>
+          <a:lnRef idx="2">
+            <a:schemeClr val="accent1">
+              <a:shade val="50000"/>
+            </a:schemeClr>
+          </a:lnRef>
+          <a:fillRef idx="1">
+            <a:schemeClr val="accent1"/>
+          </a:fillRef>
+          <a:effectRef idx="0">
+            <a:schemeClr val="accent1"/>
+          </a:effectRef>
+          <a:fontRef idx="minor">
+            <a:schemeClr val="lt1"/>
+          </a:fontRef>
+        </p:style>
+        <p:txBody>
+          <a:bodyPr vert="vert" rtlCol="0" anchor="ctr"/>
+          <a:lstStyle/>
+          <a:p>
+            <a:pPr algn="ctr"/>
+            <a:r>
+              <a:rPr lang="en-US" sz="1000" dirty="0">
+                <a:solidFill>
+                  <a:schemeClr val="bg1"/>
+                </a:solidFill>
+                <a:latin typeface="Helvetica" pitchFamily="2" charset="0"/>
+              </a:rPr>
+              <a:t>April </a:t>
+            </a:r>
+            <a:r>
+              <a:rPr lang="en-US" sz="1000" i="1" dirty="0">
+                <a:solidFill>
+                  <a:schemeClr val="bg1"/>
+                </a:solidFill>
+                <a:latin typeface="Helvetica" pitchFamily="2" charset="0"/>
+              </a:rPr>
+              <a:t>T</a:t>
+            </a:r>
+            <a:r>
+              <a:rPr lang="en-US" sz="1000" baseline="-25000" dirty="0">
+                <a:solidFill>
+                  <a:schemeClr val="bg1"/>
+                </a:solidFill>
+                <a:latin typeface="Helvetica" pitchFamily="2" charset="0"/>
+              </a:rPr>
+              <a:t>max</a:t>
+            </a:r>
+            <a:endParaRPr lang="en-US" sz="1000" dirty="0">
+              <a:solidFill>
+                <a:schemeClr val="bg1"/>
+              </a:solidFill>
+              <a:latin typeface="Helvetica" pitchFamily="2" charset="0"/>
+            </a:endParaRPr>
+          </a:p>
+        </p:txBody>
+      </p:sp>
+      <p:sp>
+        <p:nvSpPr>
+          <p:cNvPr id="35" name="TextBox 34">
+            <a:extLst>
+              <a:ext uri="{FF2B5EF4-FFF2-40B4-BE49-F238E27FC236}">
+                <a16:creationId xmlns:a16="http://schemas.microsoft.com/office/drawing/2014/main" id="{65F0C768-21DB-D44F-AEAE-24F169336050}"/>
+              </a:ext>
+            </a:extLst>
+          </p:cNvPr>
+          <p:cNvSpPr txBox="1"/>
+          <p:nvPr/>
+        </p:nvSpPr>
+        <p:spPr>
+          <a:xfrm>
+            <a:off x="918421" y="1313608"/>
+            <a:ext cx="278722" cy="246221"/>
+          </a:xfrm>
+          <a:prstGeom prst="rect">
+            <a:avLst/>
+          </a:prstGeom>
+          <a:noFill/>
+        </p:spPr>
+        <p:txBody>
+          <a:bodyPr wrap="square" rtlCol="0">
+            <a:spAutoFit/>
+          </a:bodyPr>
+          <a:lstStyle/>
+          <a:p>
+            <a:r>
+              <a:rPr lang="en-US" sz="1000" dirty="0">
+                <a:solidFill>
+                  <a:schemeClr val="bg1"/>
+                </a:solidFill>
+                <a:latin typeface="Helvetica" pitchFamily="2" charset="0"/>
+              </a:rPr>
+              <a:t>+</a:t>
+            </a:r>
+          </a:p>
+        </p:txBody>
+      </p:sp>
+      <p:sp>
+        <p:nvSpPr>
+          <p:cNvPr id="36" name="TextBox 35">
+            <a:extLst>
+              <a:ext uri="{FF2B5EF4-FFF2-40B4-BE49-F238E27FC236}">
+                <a16:creationId xmlns:a16="http://schemas.microsoft.com/office/drawing/2014/main" id="{E66F3C2C-0438-704F-8115-C4DD961551A2}"/>
+              </a:ext>
+            </a:extLst>
+          </p:cNvPr>
+          <p:cNvSpPr txBox="1"/>
+          <p:nvPr/>
+        </p:nvSpPr>
+        <p:spPr>
+          <a:xfrm>
+            <a:off x="908687" y="7751516"/>
+            <a:ext cx="278722" cy="246221"/>
+          </a:xfrm>
+          <a:prstGeom prst="rect">
+            <a:avLst/>
+          </a:prstGeom>
+          <a:noFill/>
+        </p:spPr>
+        <p:txBody>
+          <a:bodyPr wrap="square" rtlCol="0">
+            <a:spAutoFit/>
+          </a:bodyPr>
+          <a:lstStyle/>
+          <a:p>
+            <a:r>
+              <a:rPr lang="en-US" sz="1000" dirty="0">
+                <a:solidFill>
+                  <a:schemeClr val="bg1"/>
+                </a:solidFill>
+                <a:latin typeface="Helvetica" pitchFamily="2" charset="0"/>
+              </a:rPr>
+              <a:t>-</a:t>
+            </a:r>
+          </a:p>
+        </p:txBody>
+      </p:sp>
+      <p:sp>
+        <p:nvSpPr>
+          <p:cNvPr id="7" name="TextBox 6">
+            <a:extLst>
+              <a:ext uri="{FF2B5EF4-FFF2-40B4-BE49-F238E27FC236}">
+                <a16:creationId xmlns:a16="http://schemas.microsoft.com/office/drawing/2014/main" id="{8194A473-9ED4-A64B-A417-3BC1BA03E003}"/>
+              </a:ext>
+            </a:extLst>
+          </p:cNvPr>
+          <p:cNvSpPr txBox="1"/>
+          <p:nvPr/>
+        </p:nvSpPr>
+        <p:spPr>
+          <a:xfrm>
+            <a:off x="1088216" y="471912"/>
+            <a:ext cx="1831340" cy="246221"/>
+          </a:xfrm>
+          <a:prstGeom prst="rect">
+            <a:avLst/>
+          </a:prstGeom>
+          <a:solidFill>
+            <a:schemeClr val="bg1"/>
+          </a:solidFill>
+        </p:spPr>
+        <p:txBody>
+          <a:bodyPr wrap="square" rtlCol="0">
+            <a:spAutoFit/>
+          </a:bodyPr>
+          <a:lstStyle/>
+          <a:p>
+            <a:pPr algn="ctr"/>
+            <a:r>
+              <a:rPr lang="en-US" sz="1000" dirty="0">
+                <a:latin typeface="Helvetica" pitchFamily="2" charset="0"/>
+              </a:rPr>
+              <a:t>Ring porous</a:t>
+            </a:r>
+          </a:p>
+        </p:txBody>
+      </p:sp>
+      <p:sp>
+        <p:nvSpPr>
+          <p:cNvPr id="17" name="Rectangle 16">
+            <a:extLst>
+              <a:ext uri="{FF2B5EF4-FFF2-40B4-BE49-F238E27FC236}">
+                <a16:creationId xmlns:a16="http://schemas.microsoft.com/office/drawing/2014/main" id="{F1AB3D8F-661B-4BC4-88E1-2742AA06D2AE}"/>
+              </a:ext>
+            </a:extLst>
+          </p:cNvPr>
+          <p:cNvSpPr/>
+          <p:nvPr/>
+        </p:nvSpPr>
+        <p:spPr>
+          <a:xfrm>
+            <a:off x="1060423" y="5365684"/>
+            <a:ext cx="2081821" cy="91949"/>
+          </a:xfrm>
+          <a:prstGeom prst="rect">
+            <a:avLst/>
+          </a:prstGeom>
+          <a:noFill/>
+          <a:ln>
+            <a:solidFill>
+              <a:schemeClr val="tx1"/>
+            </a:solidFill>
+          </a:ln>
+        </p:spPr>
+        <p:style>
+          <a:lnRef idx="2">
+            <a:schemeClr val="accent1">
+              <a:shade val="50000"/>
+            </a:schemeClr>
+          </a:lnRef>
+          <a:fillRef idx="1">
+            <a:schemeClr val="accent1"/>
+          </a:fillRef>
+          <a:effectRef idx="0">
+            <a:schemeClr val="accent1"/>
+          </a:effectRef>
+          <a:fontRef idx="minor">
+            <a:schemeClr val="lt1"/>
+          </a:fontRef>
+        </p:style>
+        <p:txBody>
+          <a:bodyPr rtlCol="0" anchor="ctr"/>
+          <a:lstStyle/>
+          <a:p>
+            <a:pPr algn="ctr"/>
+            <a:endParaRPr lang="en-US" sz="1000" dirty="0">
+              <a:latin typeface="Helvetica" pitchFamily="2" charset="0"/>
+            </a:endParaRPr>
+          </a:p>
+        </p:txBody>
+      </p:sp>
+      <p:sp>
+        <p:nvSpPr>
+          <p:cNvPr id="19" name="TextBox 18">
+            <a:extLst>
+              <a:ext uri="{FF2B5EF4-FFF2-40B4-BE49-F238E27FC236}">
+                <a16:creationId xmlns:a16="http://schemas.microsoft.com/office/drawing/2014/main" id="{D0707454-4F2C-43EC-88FB-E277C6C27CC1}"/>
+              </a:ext>
+            </a:extLst>
+          </p:cNvPr>
+          <p:cNvSpPr txBox="1"/>
+          <p:nvPr/>
+        </p:nvSpPr>
+        <p:spPr>
+          <a:xfrm rot="16200000">
+            <a:off x="609644" y="5260479"/>
+            <a:ext cx="361665" cy="215444"/>
+          </a:xfrm>
+          <a:prstGeom prst="rect">
+            <a:avLst/>
+          </a:prstGeom>
+          <a:noFill/>
+        </p:spPr>
+        <p:txBody>
+          <a:bodyPr wrap="square" rtlCol="0">
+            <a:spAutoFit/>
+          </a:bodyPr>
+          <a:lstStyle/>
+          <a:p>
+            <a:r>
+              <a:rPr lang="en-US" sz="800" dirty="0">
+                <a:latin typeface="Helvetica" pitchFamily="2" charset="0"/>
+              </a:rPr>
+              <a:t>HF</a:t>
+            </a:r>
+          </a:p>
+        </p:txBody>
+      </p:sp>
+      <p:cxnSp>
+        <p:nvCxnSpPr>
+          <p:cNvPr id="20" name="Straight Connector 19">
+            <a:extLst>
+              <a:ext uri="{FF2B5EF4-FFF2-40B4-BE49-F238E27FC236}">
+                <a16:creationId xmlns:a16="http://schemas.microsoft.com/office/drawing/2014/main" id="{5276D36B-91EB-4F2D-AC7D-1DA02A19A556}"/>
+              </a:ext>
+            </a:extLst>
+          </p:cNvPr>
+          <p:cNvCxnSpPr>
+            <a:cxnSpLocks/>
+          </p:cNvCxnSpPr>
+          <p:nvPr/>
+        </p:nvCxnSpPr>
+        <p:spPr>
+          <a:xfrm>
+            <a:off x="874462" y="5342778"/>
+            <a:ext cx="0" cy="124987"/>
+          </a:xfrm>
+          <a:prstGeom prst="line">
+            <a:avLst/>
+          </a:prstGeom>
+          <a:ln w="12700">
+            <a:solidFill>
+              <a:schemeClr val="tx1"/>
+            </a:solidFill>
+          </a:ln>
+        </p:spPr>
+        <p:style>
+          <a:lnRef idx="1">
+            <a:schemeClr val="accent1"/>
+          </a:lnRef>
+          <a:fillRef idx="0">
+            <a:schemeClr val="accent1"/>
+          </a:fillRef>
+          <a:effectRef idx="0">
+            <a:schemeClr val="accent1"/>
+          </a:effectRef>
+          <a:fontRef idx="minor">
+            <a:schemeClr val="tx1"/>
+          </a:fontRef>
+        </p:style>
+      </p:cxnSp>
+      <p:sp>
+        <p:nvSpPr>
+          <p:cNvPr id="23" name="Rectangle 22">
+            <a:extLst>
+              <a:ext uri="{FF2B5EF4-FFF2-40B4-BE49-F238E27FC236}">
+                <a16:creationId xmlns:a16="http://schemas.microsoft.com/office/drawing/2014/main" id="{55173A8E-43FB-481F-AF18-3ED7EA457849}"/>
+              </a:ext>
+            </a:extLst>
+          </p:cNvPr>
+          <p:cNvSpPr/>
+          <p:nvPr/>
+        </p:nvSpPr>
+        <p:spPr>
+          <a:xfrm>
+            <a:off x="1057782" y="1695983"/>
+            <a:ext cx="2078072" cy="393064"/>
+          </a:xfrm>
+          <a:prstGeom prst="rect">
+            <a:avLst/>
+          </a:prstGeom>
+          <a:noFill/>
+          <a:ln>
+            <a:solidFill>
+              <a:schemeClr val="tx1"/>
+            </a:solidFill>
+          </a:ln>
+        </p:spPr>
+        <p:style>
+          <a:lnRef idx="2">
+            <a:schemeClr val="accent1">
+              <a:shade val="50000"/>
+            </a:schemeClr>
+          </a:lnRef>
+          <a:fillRef idx="1">
+            <a:schemeClr val="accent1"/>
+          </a:fillRef>
+          <a:effectRef idx="0">
+            <a:schemeClr val="accent1"/>
+          </a:effectRef>
+          <a:fontRef idx="minor">
+            <a:schemeClr val="lt1"/>
+          </a:fontRef>
+        </p:style>
+        <p:txBody>
+          <a:bodyPr rtlCol="0" anchor="ctr"/>
+          <a:lstStyle/>
+          <a:p>
+            <a:pPr algn="ctr"/>
+            <a:endParaRPr lang="en-US" sz="1000">
+              <a:latin typeface="Helvetica" pitchFamily="2" charset="0"/>
+            </a:endParaRPr>
+          </a:p>
+        </p:txBody>
+      </p:sp>
+      <p:cxnSp>
+        <p:nvCxnSpPr>
+          <p:cNvPr id="24" name="Straight Connector 23">
+            <a:extLst>
+              <a:ext uri="{FF2B5EF4-FFF2-40B4-BE49-F238E27FC236}">
+                <a16:creationId xmlns:a16="http://schemas.microsoft.com/office/drawing/2014/main" id="{111264E6-2520-49AD-82E5-092A0941ABE5}"/>
+              </a:ext>
+            </a:extLst>
+          </p:cNvPr>
+          <p:cNvCxnSpPr>
+            <a:cxnSpLocks/>
+          </p:cNvCxnSpPr>
+          <p:nvPr/>
+        </p:nvCxnSpPr>
+        <p:spPr>
+          <a:xfrm>
+            <a:off x="831545" y="1723429"/>
+            <a:ext cx="0" cy="352122"/>
+          </a:xfrm>
+          <a:prstGeom prst="line">
+            <a:avLst/>
+          </a:prstGeom>
+          <a:ln w="12700">
+            <a:solidFill>
+              <a:schemeClr val="tx1"/>
+            </a:solidFill>
+          </a:ln>
+        </p:spPr>
+        <p:style>
+          <a:lnRef idx="1">
+            <a:schemeClr val="accent1"/>
+          </a:lnRef>
+          <a:fillRef idx="0">
+            <a:schemeClr val="accent1"/>
+          </a:fillRef>
+          <a:effectRef idx="0">
+            <a:schemeClr val="accent1"/>
+          </a:effectRef>
+          <a:fontRef idx="minor">
+            <a:schemeClr val="tx1"/>
+          </a:fontRef>
+        </p:style>
+      </p:cxnSp>
+      <p:sp>
+        <p:nvSpPr>
+          <p:cNvPr id="25" name="TextBox 24">
+            <a:extLst>
+              <a:ext uri="{FF2B5EF4-FFF2-40B4-BE49-F238E27FC236}">
+                <a16:creationId xmlns:a16="http://schemas.microsoft.com/office/drawing/2014/main" id="{AD4EB588-31C5-4B56-89C0-515E302CC901}"/>
+              </a:ext>
+            </a:extLst>
+          </p:cNvPr>
+          <p:cNvSpPr txBox="1"/>
+          <p:nvPr/>
+        </p:nvSpPr>
+        <p:spPr>
+          <a:xfrm rot="16200000">
+            <a:off x="426306" y="1704823"/>
+            <a:ext cx="638692" cy="215444"/>
+          </a:xfrm>
+          <a:prstGeom prst="rect">
+            <a:avLst/>
+          </a:prstGeom>
+          <a:noFill/>
+        </p:spPr>
+        <p:txBody>
+          <a:bodyPr wrap="square" rtlCol="0">
+            <a:spAutoFit/>
+          </a:bodyPr>
+          <a:lstStyle/>
+          <a:p>
+            <a:r>
+              <a:rPr lang="en-US" sz="800" dirty="0">
+                <a:latin typeface="Helvetica" pitchFamily="2" charset="0"/>
+              </a:rPr>
+              <a:t>SCBI</a:t>
+            </a:r>
+          </a:p>
+        </p:txBody>
+      </p:sp>
       <p:grpSp>
         <p:nvGrpSpPr>
-          <p:cNvPr id="31" name="Group 30">
+          <p:cNvPr id="14" name="Group 13">
             <a:extLst>
               <a:ext uri="{FF2B5EF4-FFF2-40B4-BE49-F238E27FC236}">
-                <a16:creationId xmlns:a16="http://schemas.microsoft.com/office/drawing/2014/main" id="{5ECB5476-59C7-4786-889C-231EAB50583A}"/>
+                <a16:creationId xmlns:a16="http://schemas.microsoft.com/office/drawing/2014/main" id="{C71D9C81-2CDC-0845-8F78-2B540C874A74}"/>
               </a:ext>
             </a:extLst>
           </p:cNvPr>
@@ -4512,18 +5186,48 @@
         </p:nvGrpSpPr>
         <p:grpSpPr>
           <a:xfrm>
-            <a:off x="-120977" y="59767"/>
-            <a:ext cx="7151427" cy="7937970"/>
-            <a:chOff x="-120977" y="141653"/>
-            <a:chExt cx="7151427" cy="7937970"/>
+            <a:off x="5733049" y="6185539"/>
+            <a:ext cx="912787" cy="680442"/>
+            <a:chOff x="5922424" y="6188740"/>
+            <a:chExt cx="912787" cy="680442"/>
           </a:xfrm>
         </p:grpSpPr>
+        <p:pic>
+          <p:nvPicPr>
+            <p:cNvPr id="15" name="Picture 14">
+              <a:extLst>
+                <a:ext uri="{FF2B5EF4-FFF2-40B4-BE49-F238E27FC236}">
+                  <a16:creationId xmlns:a16="http://schemas.microsoft.com/office/drawing/2014/main" id="{734A9B20-B9BE-C048-85BC-4D6865AE6D01}"/>
+                </a:ext>
+              </a:extLst>
+            </p:cNvPr>
+            <p:cNvPicPr>
+              <a:picLocks noChangeAspect="1"/>
+            </p:cNvPicPr>
+            <p:nvPr/>
+          </p:nvPicPr>
+          <p:blipFill>
+            <a:blip r:embed="rId5"/>
+            <a:stretch>
+              <a:fillRect/>
+            </a:stretch>
+          </p:blipFill>
+          <p:spPr>
+            <a:xfrm>
+              <a:off x="5922424" y="6188740"/>
+              <a:ext cx="912787" cy="680442"/>
+            </a:xfrm>
+            <a:prstGeom prst="rect">
+              <a:avLst/>
+            </a:prstGeom>
+          </p:spPr>
+        </p:pic>
         <p:sp>
           <p:nvSpPr>
-            <p:cNvPr id="6" name="Rectangle 5">
+            <p:cNvPr id="16" name="Rectangle 15">
               <a:extLst>
                 <a:ext uri="{FF2B5EF4-FFF2-40B4-BE49-F238E27FC236}">
-                  <a16:creationId xmlns:a16="http://schemas.microsoft.com/office/drawing/2014/main" id="{2827099A-799C-4D2C-AD9D-F9A8D8DA4D6D}"/>
+                  <a16:creationId xmlns:a16="http://schemas.microsoft.com/office/drawing/2014/main" id="{CD6E4E81-4536-F24B-86D6-24D3C0A52C4B}"/>
                 </a:ext>
               </a:extLst>
             </p:cNvPr>
@@ -4532,8 +5236,8 @@
           </p:nvSpPr>
           <p:spPr>
             <a:xfrm>
-              <a:off x="-120977" y="141653"/>
-              <a:ext cx="7151427" cy="7937970"/>
+              <a:off x="6172419" y="6490907"/>
+              <a:ext cx="129989" cy="121278"/>
             </a:xfrm>
             <a:prstGeom prst="rect">
               <a:avLst/>
@@ -4568,56 +5272,141 @@
             <a:lstStyle/>
             <a:p>
               <a:pPr algn="ctr"/>
-              <a:endParaRPr lang="en-US"/>
-            </a:p>
-          </p:txBody>
-        </p:sp>
-        <p:sp>
-          <p:nvSpPr>
-            <p:cNvPr id="8" name="TextBox 7">
-              <a:extLst>
-                <a:ext uri="{FF2B5EF4-FFF2-40B4-BE49-F238E27FC236}">
-                  <a16:creationId xmlns:a16="http://schemas.microsoft.com/office/drawing/2014/main" id="{B2960B18-C375-1844-B59E-B66AAF22394A}"/>
-                </a:ext>
-              </a:extLst>
-            </p:cNvPr>
-            <p:cNvSpPr txBox="1"/>
-            <p:nvPr/>
-          </p:nvSpPr>
-          <p:spPr>
-            <a:xfrm>
-              <a:off x="3532396" y="508944"/>
-              <a:ext cx="2238459" cy="246221"/>
-            </a:xfrm>
-            <a:prstGeom prst="rect">
-              <a:avLst/>
-            </a:prstGeom>
-            <a:solidFill>
-              <a:schemeClr val="bg1"/>
-            </a:solidFill>
-          </p:spPr>
-          <p:txBody>
-            <a:bodyPr wrap="square" rtlCol="0">
-              <a:spAutoFit/>
-            </a:bodyPr>
-            <a:lstStyle/>
-            <a:p>
-              <a:pPr algn="ctr"/>
               <a:r>
-                <a:rPr lang="en-US" sz="1000" dirty="0">
-                  <a:latin typeface="Helvetica" pitchFamily="2" charset="0"/>
+                <a:rPr lang="en-US" sz="900" dirty="0">
+                  <a:solidFill>
+                    <a:schemeClr val="tx1"/>
+                  </a:solidFill>
                 </a:rPr>
-                <a:t>Diffuse porous</a:t>
+                <a:t>*</a:t>
               </a:r>
             </a:p>
           </p:txBody>
         </p:sp>
+      </p:grpSp>
+      <p:sp>
+        <p:nvSpPr>
+          <p:cNvPr id="18" name="Rectangle 17">
+            <a:extLst>
+              <a:ext uri="{FF2B5EF4-FFF2-40B4-BE49-F238E27FC236}">
+                <a16:creationId xmlns:a16="http://schemas.microsoft.com/office/drawing/2014/main" id="{94D313B5-25D4-4FD4-A0EB-7E2027946522}"/>
+              </a:ext>
+            </a:extLst>
+          </p:cNvPr>
+          <p:cNvSpPr/>
+          <p:nvPr/>
+        </p:nvSpPr>
+        <p:spPr>
+          <a:xfrm>
+            <a:off x="3596085" y="5997044"/>
+            <a:ext cx="2063499" cy="172347"/>
+          </a:xfrm>
+          <a:prstGeom prst="rect">
+            <a:avLst/>
+          </a:prstGeom>
+          <a:noFill/>
+          <a:ln>
+            <a:solidFill>
+              <a:schemeClr val="tx1"/>
+            </a:solidFill>
+          </a:ln>
+        </p:spPr>
+        <p:style>
+          <a:lnRef idx="2">
+            <a:schemeClr val="accent1">
+              <a:shade val="50000"/>
+            </a:schemeClr>
+          </a:lnRef>
+          <a:fillRef idx="1">
+            <a:schemeClr val="accent1"/>
+          </a:fillRef>
+          <a:effectRef idx="0">
+            <a:schemeClr val="accent1"/>
+          </a:effectRef>
+          <a:fontRef idx="minor">
+            <a:schemeClr val="lt1"/>
+          </a:fontRef>
+        </p:style>
+        <p:txBody>
+          <a:bodyPr rtlCol="0" anchor="ctr"/>
+          <a:lstStyle/>
+          <a:p>
+            <a:pPr algn="ctr"/>
+            <a:endParaRPr lang="en-US" sz="1000" dirty="0">
+              <a:latin typeface="Helvetica" pitchFamily="2" charset="0"/>
+            </a:endParaRPr>
+          </a:p>
+        </p:txBody>
+      </p:sp>
+      <p:cxnSp>
+        <p:nvCxnSpPr>
+          <p:cNvPr id="21" name="Straight Connector 20">
+            <a:extLst>
+              <a:ext uri="{FF2B5EF4-FFF2-40B4-BE49-F238E27FC236}">
+                <a16:creationId xmlns:a16="http://schemas.microsoft.com/office/drawing/2014/main" id="{9A39C502-BC8C-45C7-97B1-8E2138FD37A1}"/>
+              </a:ext>
+            </a:extLst>
+          </p:cNvPr>
+          <p:cNvCxnSpPr>
+            <a:cxnSpLocks/>
+          </p:cNvCxnSpPr>
+          <p:nvPr/>
+        </p:nvCxnSpPr>
+        <p:spPr>
+          <a:xfrm>
+            <a:off x="3400396" y="5997044"/>
+            <a:ext cx="0" cy="152916"/>
+          </a:xfrm>
+          <a:prstGeom prst="line">
+            <a:avLst/>
+          </a:prstGeom>
+          <a:ln w="12700">
+            <a:solidFill>
+              <a:schemeClr val="tx1"/>
+            </a:solidFill>
+          </a:ln>
+        </p:spPr>
+        <p:style>
+          <a:lnRef idx="1">
+            <a:schemeClr val="accent1"/>
+          </a:lnRef>
+          <a:fillRef idx="0">
+            <a:schemeClr val="accent1"/>
+          </a:fillRef>
+          <a:effectRef idx="0">
+            <a:schemeClr val="accent1"/>
+          </a:effectRef>
+          <a:fontRef idx="minor">
+            <a:schemeClr val="tx1"/>
+          </a:fontRef>
+        </p:style>
+      </p:cxnSp>
+      <p:grpSp>
+        <p:nvGrpSpPr>
+          <p:cNvPr id="26" name="Group 25">
+            <a:extLst>
+              <a:ext uri="{FF2B5EF4-FFF2-40B4-BE49-F238E27FC236}">
+                <a16:creationId xmlns:a16="http://schemas.microsoft.com/office/drawing/2014/main" id="{748DDA4F-DFDC-4F15-8E4A-D56A72AD8836}"/>
+              </a:ext>
+            </a:extLst>
+          </p:cNvPr>
+          <p:cNvGrpSpPr/>
+          <p:nvPr/>
+        </p:nvGrpSpPr>
+        <p:grpSpPr>
+          <a:xfrm>
+            <a:off x="3231898" y="1735330"/>
+            <a:ext cx="2432132" cy="680442"/>
+            <a:chOff x="971174" y="4885200"/>
+            <a:chExt cx="2351421" cy="361665"/>
+          </a:xfrm>
+        </p:grpSpPr>
         <p:sp>
           <p:nvSpPr>
-            <p:cNvPr id="27" name="TextBox 26">
+            <p:cNvPr id="28" name="TextBox 27">
               <a:extLst>
                 <a:ext uri="{FF2B5EF4-FFF2-40B4-BE49-F238E27FC236}">
-                  <a16:creationId xmlns:a16="http://schemas.microsoft.com/office/drawing/2014/main" id="{B2491FE7-9723-CD46-9B89-7050774C27C9}"/>
+                  <a16:creationId xmlns:a16="http://schemas.microsoft.com/office/drawing/2014/main" id="{14F97EFB-148F-48D8-A67E-DBF4924CF454}"/>
                 </a:ext>
               </a:extLst>
             </p:cNvPr>
@@ -4626,344 +5415,7 @@
           </p:nvSpPr>
           <p:spPr>
             <a:xfrm rot="16200000">
-              <a:off x="-11890" y="3809444"/>
-              <a:ext cx="1403921" cy="246221"/>
-            </a:xfrm>
-            <a:prstGeom prst="rect">
-              <a:avLst/>
-            </a:prstGeom>
-            <a:noFill/>
-          </p:spPr>
-          <p:txBody>
-            <a:bodyPr wrap="square" rtlCol="0">
-              <a:spAutoFit/>
-            </a:bodyPr>
-            <a:lstStyle/>
-            <a:p>
-              <a:r>
-                <a:rPr lang="en-US" sz="1000" b="1" dirty="0">
-                  <a:latin typeface="Helvetica" pitchFamily="2" charset="0"/>
-                </a:rPr>
-                <a:t>Chronology number</a:t>
-              </a:r>
-            </a:p>
-          </p:txBody>
-        </p:sp>
-        <p:sp>
-          <p:nvSpPr>
-            <p:cNvPr id="34" name="Down Arrow 33">
-              <a:extLst>
-                <a:ext uri="{FF2B5EF4-FFF2-40B4-BE49-F238E27FC236}">
-                  <a16:creationId xmlns:a16="http://schemas.microsoft.com/office/drawing/2014/main" id="{F1B13D42-2553-8148-87B1-32BA355FB23F}"/>
-                </a:ext>
-              </a:extLst>
-            </p:cNvPr>
-            <p:cNvSpPr/>
-            <p:nvPr/>
-          </p:nvSpPr>
-          <p:spPr>
-            <a:xfrm rot="10800000">
-              <a:off x="204338" y="1298484"/>
-              <a:ext cx="362618" cy="5495925"/>
-            </a:xfrm>
-            <a:prstGeom prst="downArrow">
-              <a:avLst/>
-            </a:prstGeom>
-            <a:gradFill>
-              <a:gsLst>
-                <a:gs pos="0">
-                  <a:schemeClr val="accent1">
-                    <a:lumMod val="40000"/>
-                    <a:lumOff val="60000"/>
-                  </a:schemeClr>
-                </a:gs>
-                <a:gs pos="100000">
-                  <a:srgbClr val="C00000"/>
-                </a:gs>
-              </a:gsLst>
-              <a:lin ang="5400000" scaled="1"/>
-            </a:gradFill>
-            <a:ln>
-              <a:solidFill>
-                <a:schemeClr val="tx1"/>
-              </a:solidFill>
-            </a:ln>
-          </p:spPr>
-          <p:style>
-            <a:lnRef idx="2">
-              <a:schemeClr val="accent1">
-                <a:shade val="50000"/>
-              </a:schemeClr>
-            </a:lnRef>
-            <a:fillRef idx="1">
-              <a:schemeClr val="accent1"/>
-            </a:fillRef>
-            <a:effectRef idx="0">
-              <a:schemeClr val="accent1"/>
-            </a:effectRef>
-            <a:fontRef idx="minor">
-              <a:schemeClr val="lt1"/>
-            </a:fontRef>
-          </p:style>
-          <p:txBody>
-            <a:bodyPr vert="vert" rtlCol="0" anchor="ctr"/>
-            <a:lstStyle/>
-            <a:p>
-              <a:pPr algn="ctr"/>
-              <a:r>
-                <a:rPr lang="en-US" sz="1000" dirty="0">
-                  <a:solidFill>
-                    <a:schemeClr val="bg1"/>
-                  </a:solidFill>
-                  <a:latin typeface="Helvetica" pitchFamily="2" charset="0"/>
-                </a:rPr>
-                <a:t>April </a:t>
-              </a:r>
-              <a:r>
-                <a:rPr lang="en-US" sz="1000" i="1" dirty="0">
-                  <a:solidFill>
-                    <a:schemeClr val="bg1"/>
-                  </a:solidFill>
-                  <a:latin typeface="Helvetica" pitchFamily="2" charset="0"/>
-                </a:rPr>
-                <a:t>T</a:t>
-              </a:r>
-              <a:r>
-                <a:rPr lang="en-US" sz="1000" baseline="-25000" dirty="0">
-                  <a:solidFill>
-                    <a:schemeClr val="bg1"/>
-                  </a:solidFill>
-                  <a:latin typeface="Helvetica" pitchFamily="2" charset="0"/>
-                </a:rPr>
-                <a:t>max</a:t>
-              </a:r>
-              <a:endParaRPr lang="en-US" sz="1000" dirty="0">
-                <a:solidFill>
-                  <a:schemeClr val="bg1"/>
-                </a:solidFill>
-                <a:latin typeface="Helvetica" pitchFamily="2" charset="0"/>
-              </a:endParaRPr>
-            </a:p>
-          </p:txBody>
-        </p:sp>
-        <p:sp>
-          <p:nvSpPr>
-            <p:cNvPr id="35" name="TextBox 34">
-              <a:extLst>
-                <a:ext uri="{FF2B5EF4-FFF2-40B4-BE49-F238E27FC236}">
-                  <a16:creationId xmlns:a16="http://schemas.microsoft.com/office/drawing/2014/main" id="{65F0C768-21DB-D44F-AEAE-24F169336050}"/>
-                </a:ext>
-              </a:extLst>
-            </p:cNvPr>
-            <p:cNvSpPr txBox="1"/>
-            <p:nvPr/>
-          </p:nvSpPr>
-          <p:spPr>
-            <a:xfrm>
-              <a:off x="918421" y="1395494"/>
-              <a:ext cx="278722" cy="246221"/>
-            </a:xfrm>
-            <a:prstGeom prst="rect">
-              <a:avLst/>
-            </a:prstGeom>
-            <a:noFill/>
-          </p:spPr>
-          <p:txBody>
-            <a:bodyPr wrap="square" rtlCol="0">
-              <a:spAutoFit/>
-            </a:bodyPr>
-            <a:lstStyle/>
-            <a:p>
-              <a:r>
-                <a:rPr lang="en-US" sz="1000" dirty="0">
-                  <a:solidFill>
-                    <a:schemeClr val="bg1"/>
-                  </a:solidFill>
-                  <a:latin typeface="Helvetica" pitchFamily="2" charset="0"/>
-                </a:rPr>
-                <a:t>+</a:t>
-              </a:r>
-            </a:p>
-          </p:txBody>
-        </p:sp>
-        <p:sp>
-          <p:nvSpPr>
-            <p:cNvPr id="36" name="TextBox 35">
-              <a:extLst>
-                <a:ext uri="{FF2B5EF4-FFF2-40B4-BE49-F238E27FC236}">
-                  <a16:creationId xmlns:a16="http://schemas.microsoft.com/office/drawing/2014/main" id="{E66F3C2C-0438-704F-8115-C4DD961551A2}"/>
-                </a:ext>
-              </a:extLst>
-            </p:cNvPr>
-            <p:cNvSpPr txBox="1"/>
-            <p:nvPr/>
-          </p:nvSpPr>
-          <p:spPr>
-            <a:xfrm>
-              <a:off x="908687" y="7833402"/>
-              <a:ext cx="278722" cy="246221"/>
-            </a:xfrm>
-            <a:prstGeom prst="rect">
-              <a:avLst/>
-            </a:prstGeom>
-            <a:noFill/>
-          </p:spPr>
-          <p:txBody>
-            <a:bodyPr wrap="square" rtlCol="0">
-              <a:spAutoFit/>
-            </a:bodyPr>
-            <a:lstStyle/>
-            <a:p>
-              <a:r>
-                <a:rPr lang="en-US" sz="1000" dirty="0">
-                  <a:solidFill>
-                    <a:schemeClr val="bg1"/>
-                  </a:solidFill>
-                  <a:latin typeface="Helvetica" pitchFamily="2" charset="0"/>
-                </a:rPr>
-                <a:t>-</a:t>
-              </a:r>
-            </a:p>
-          </p:txBody>
-        </p:sp>
-        <p:sp>
-          <p:nvSpPr>
-            <p:cNvPr id="7" name="TextBox 6">
-              <a:extLst>
-                <a:ext uri="{FF2B5EF4-FFF2-40B4-BE49-F238E27FC236}">
-                  <a16:creationId xmlns:a16="http://schemas.microsoft.com/office/drawing/2014/main" id="{8194A473-9ED4-A64B-A417-3BC1BA03E003}"/>
-                </a:ext>
-              </a:extLst>
-            </p:cNvPr>
-            <p:cNvSpPr txBox="1"/>
-            <p:nvPr/>
-          </p:nvSpPr>
-          <p:spPr>
-            <a:xfrm>
-              <a:off x="1088216" y="553798"/>
-              <a:ext cx="1831340" cy="246221"/>
-            </a:xfrm>
-            <a:prstGeom prst="rect">
-              <a:avLst/>
-            </a:prstGeom>
-            <a:solidFill>
-              <a:schemeClr val="bg1"/>
-            </a:solidFill>
-          </p:spPr>
-          <p:txBody>
-            <a:bodyPr wrap="square" rtlCol="0">
-              <a:spAutoFit/>
-            </a:bodyPr>
-            <a:lstStyle/>
-            <a:p>
-              <a:pPr algn="ctr"/>
-              <a:r>
-                <a:rPr lang="en-US" sz="1000" dirty="0">
-                  <a:latin typeface="Helvetica" pitchFamily="2" charset="0"/>
-                </a:rPr>
-                <a:t>Ring porous</a:t>
-              </a:r>
-            </a:p>
-          </p:txBody>
-        </p:sp>
-        <p:pic>
-          <p:nvPicPr>
-            <p:cNvPr id="12" name="Picture 11" descr="Chart&#10;&#10;Description automatically generated with medium confidence">
-              <a:extLst>
-                <a:ext uri="{FF2B5EF4-FFF2-40B4-BE49-F238E27FC236}">
-                  <a16:creationId xmlns:a16="http://schemas.microsoft.com/office/drawing/2014/main" id="{9C1C99C1-1886-4AE9-8944-1D8696B484C5}"/>
-                </a:ext>
-              </a:extLst>
-            </p:cNvPr>
-            <p:cNvPicPr>
-              <a:picLocks noChangeAspect="1"/>
-            </p:cNvPicPr>
-            <p:nvPr/>
-          </p:nvPicPr>
-          <p:blipFill rotWithShape="1">
-            <a:blip r:embed="rId3"/>
-            <a:srcRect l="12674" t="3605" r="19907" b="8256"/>
-            <a:stretch/>
-          </p:blipFill>
-          <p:spPr>
-            <a:xfrm>
-              <a:off x="829413" y="761487"/>
-              <a:ext cx="2350058" cy="6144768"/>
-            </a:xfrm>
-            <a:prstGeom prst="rect">
-              <a:avLst/>
-            </a:prstGeom>
-          </p:spPr>
-        </p:pic>
-        <p:sp>
-          <p:nvSpPr>
-            <p:cNvPr id="17" name="Rectangle 16">
-              <a:extLst>
-                <a:ext uri="{FF2B5EF4-FFF2-40B4-BE49-F238E27FC236}">
-                  <a16:creationId xmlns:a16="http://schemas.microsoft.com/office/drawing/2014/main" id="{F1AB3D8F-661B-4BC4-88E1-2742AA06D2AE}"/>
-                </a:ext>
-              </a:extLst>
-            </p:cNvPr>
-            <p:cNvSpPr/>
-            <p:nvPr/>
-          </p:nvSpPr>
-          <p:spPr>
-            <a:xfrm>
-              <a:off x="1012049" y="5428622"/>
-              <a:ext cx="2081821" cy="91949"/>
-            </a:xfrm>
-            <a:prstGeom prst="rect">
-              <a:avLst/>
-            </a:prstGeom>
-            <a:noFill/>
-            <a:ln>
-              <a:solidFill>
-                <a:schemeClr val="tx1"/>
-              </a:solidFill>
-            </a:ln>
-          </p:spPr>
-          <p:style>
-            <a:lnRef idx="2">
-              <a:schemeClr val="accent1">
-                <a:shade val="50000"/>
-              </a:schemeClr>
-            </a:lnRef>
-            <a:fillRef idx="1">
-              <a:schemeClr val="accent1"/>
-            </a:fillRef>
-            <a:effectRef idx="0">
-              <a:schemeClr val="accent1"/>
-            </a:effectRef>
-            <a:fontRef idx="minor">
-              <a:schemeClr val="lt1"/>
-            </a:fontRef>
-          </p:style>
-          <p:txBody>
-            <a:bodyPr rtlCol="0" anchor="ctr"/>
-            <a:lstStyle/>
-            <a:p>
-              <a:pPr algn="ctr"/>
-              <a:endParaRPr lang="en-US" sz="1000" dirty="0">
-                <a:latin typeface="Helvetica" pitchFamily="2" charset="0"/>
-              </a:endParaRPr>
-            </a:p>
-          </p:txBody>
-        </p:sp>
-        <p:sp>
-          <p:nvSpPr>
-            <p:cNvPr id="19" name="TextBox 18">
-              <a:extLst>
-                <a:ext uri="{FF2B5EF4-FFF2-40B4-BE49-F238E27FC236}">
-                  <a16:creationId xmlns:a16="http://schemas.microsoft.com/office/drawing/2014/main" id="{D0707454-4F2C-43EC-88FB-E277C6C27CC1}"/>
-                </a:ext>
-              </a:extLst>
-            </p:cNvPr>
-            <p:cNvSpPr txBox="1"/>
-            <p:nvPr/>
-          </p:nvSpPr>
-          <p:spPr>
-            <a:xfrm rot="16200000">
-              <a:off x="609644" y="5342365"/>
+              <a:off x="898063" y="4958311"/>
               <a:ext cx="361665" cy="215444"/>
             </a:xfrm>
             <a:prstGeom prst="rect">
@@ -4981,97 +5433,17 @@
                 <a:rPr lang="en-US" sz="800" dirty="0">
                   <a:latin typeface="Helvetica" pitchFamily="2" charset="0"/>
                 </a:rPr>
-                <a:t>HF</a:t>
-              </a:r>
-            </a:p>
-          </p:txBody>
-        </p:sp>
-        <p:cxnSp>
-          <p:nvCxnSpPr>
-            <p:cNvPr id="20" name="Straight Connector 19">
-              <a:extLst>
-                <a:ext uri="{FF2B5EF4-FFF2-40B4-BE49-F238E27FC236}">
-                  <a16:creationId xmlns:a16="http://schemas.microsoft.com/office/drawing/2014/main" id="{5276D36B-91EB-4F2D-AC7D-1DA02A19A556}"/>
-                </a:ext>
-              </a:extLst>
-            </p:cNvPr>
-            <p:cNvCxnSpPr>
-              <a:cxnSpLocks/>
-            </p:cNvCxnSpPr>
-            <p:nvPr/>
-          </p:nvCxnSpPr>
-          <p:spPr>
-            <a:xfrm>
-              <a:off x="874462" y="5424664"/>
-              <a:ext cx="0" cy="124987"/>
-            </a:xfrm>
-            <a:prstGeom prst="line">
-              <a:avLst/>
-            </a:prstGeom>
-            <a:ln w="12700">
-              <a:solidFill>
-                <a:schemeClr val="tx1"/>
-              </a:solidFill>
-            </a:ln>
-          </p:spPr>
-          <p:style>
-            <a:lnRef idx="1">
-              <a:schemeClr val="accent1"/>
-            </a:lnRef>
-            <a:fillRef idx="0">
-              <a:schemeClr val="accent1"/>
-            </a:fillRef>
-            <a:effectRef idx="0">
-              <a:schemeClr val="accent1"/>
-            </a:effectRef>
-            <a:fontRef idx="minor">
-              <a:schemeClr val="tx1"/>
-            </a:fontRef>
-          </p:style>
-        </p:cxnSp>
-        <p:sp>
-          <p:nvSpPr>
-            <p:cNvPr id="22" name="TextBox 21">
-              <a:extLst>
-                <a:ext uri="{FF2B5EF4-FFF2-40B4-BE49-F238E27FC236}">
-                  <a16:creationId xmlns:a16="http://schemas.microsoft.com/office/drawing/2014/main" id="{5BBA2210-9DD6-46BE-883B-57B76580136B}"/>
-                </a:ext>
-              </a:extLst>
-            </p:cNvPr>
-            <p:cNvSpPr txBox="1"/>
-            <p:nvPr/>
-          </p:nvSpPr>
-          <p:spPr>
-            <a:xfrm rot="16200000">
-              <a:off x="3351564" y="6020484"/>
-              <a:ext cx="361665" cy="215444"/>
-            </a:xfrm>
-            <a:prstGeom prst="rect">
-              <a:avLst/>
-            </a:prstGeom>
-            <a:noFill/>
-          </p:spPr>
-          <p:txBody>
-            <a:bodyPr wrap="square" rtlCol="0">
-              <a:spAutoFit/>
-            </a:bodyPr>
-            <a:lstStyle/>
-            <a:p>
-              <a:r>
-                <a:rPr lang="en-US" sz="800" dirty="0">
-                  <a:latin typeface="Helvetica" pitchFamily="2" charset="0"/>
-                </a:rPr>
-                <a:t>HF</a:t>
+                <a:t>SCBI</a:t>
               </a:r>
             </a:p>
           </p:txBody>
         </p:sp>
         <p:sp>
           <p:nvSpPr>
-            <p:cNvPr id="23" name="Rectangle 22">
+            <p:cNvPr id="29" name="Rectangle 28">
               <a:extLst>
                 <a:ext uri="{FF2B5EF4-FFF2-40B4-BE49-F238E27FC236}">
-                  <a16:creationId xmlns:a16="http://schemas.microsoft.com/office/drawing/2014/main" id="{55173A8E-43FB-481F-AF18-3ED7EA457849}"/>
+                  <a16:creationId xmlns:a16="http://schemas.microsoft.com/office/drawing/2014/main" id="{E78B84E7-3CF5-40B1-8099-7777BCDF812C}"/>
                 </a:ext>
               </a:extLst>
             </p:cNvPr>
@@ -5080,8 +5452,8 @@
           </p:nvSpPr>
           <p:spPr>
             <a:xfrm>
-              <a:off x="1020150" y="1727166"/>
-              <a:ext cx="2078072" cy="434006"/>
+              <a:off x="1334079" y="5084485"/>
+              <a:ext cx="1988516" cy="78979"/>
             </a:xfrm>
             <a:prstGeom prst="rect">
               <a:avLst/>
@@ -5122,10 +5494,10 @@
         </p:sp>
         <p:cxnSp>
           <p:nvCxnSpPr>
-            <p:cNvPr id="24" name="Straight Connector 23">
+            <p:cNvPr id="30" name="Straight Connector 29">
               <a:extLst>
                 <a:ext uri="{FF2B5EF4-FFF2-40B4-BE49-F238E27FC236}">
-                  <a16:creationId xmlns:a16="http://schemas.microsoft.com/office/drawing/2014/main" id="{111264E6-2520-49AD-82E5-092A0941ABE5}"/>
+                  <a16:creationId xmlns:a16="http://schemas.microsoft.com/office/drawing/2014/main" id="{9AEA6C40-AA50-4404-8556-DAFD5BFF4747}"/>
                 </a:ext>
               </a:extLst>
             </p:cNvPr>
@@ -5136,8 +5508,8 @@
           </p:nvCxnSpPr>
           <p:spPr>
             <a:xfrm>
-              <a:off x="831545" y="1777869"/>
-              <a:ext cx="0" cy="352122"/>
+              <a:off x="1149593" y="5073500"/>
+              <a:ext cx="5129" cy="100949"/>
             </a:xfrm>
             <a:prstGeom prst="line">
               <a:avLst/>
@@ -5163,516 +5535,44 @@
             </a:fontRef>
           </p:style>
         </p:cxnSp>
-        <p:sp>
-          <p:nvSpPr>
-            <p:cNvPr id="25" name="TextBox 24">
-              <a:extLst>
-                <a:ext uri="{FF2B5EF4-FFF2-40B4-BE49-F238E27FC236}">
-                  <a16:creationId xmlns:a16="http://schemas.microsoft.com/office/drawing/2014/main" id="{AD4EB588-31C5-4B56-89C0-515E302CC901}"/>
-                </a:ext>
-              </a:extLst>
-            </p:cNvPr>
-            <p:cNvSpPr txBox="1"/>
-            <p:nvPr/>
-          </p:nvSpPr>
-          <p:spPr>
-            <a:xfrm rot="16200000">
-              <a:off x="446422" y="1734104"/>
-              <a:ext cx="638692" cy="215444"/>
-            </a:xfrm>
-            <a:prstGeom prst="rect">
-              <a:avLst/>
-            </a:prstGeom>
-            <a:noFill/>
-          </p:spPr>
-          <p:txBody>
-            <a:bodyPr wrap="square" rtlCol="0">
-              <a:spAutoFit/>
-            </a:bodyPr>
-            <a:lstStyle/>
-            <a:p>
-              <a:r>
-                <a:rPr lang="en-US" sz="800" dirty="0">
-                  <a:latin typeface="Helvetica" pitchFamily="2" charset="0"/>
-                </a:rPr>
-                <a:t>SCBI</a:t>
-              </a:r>
-            </a:p>
-          </p:txBody>
-        </p:sp>
-        <p:grpSp>
-          <p:nvGrpSpPr>
-            <p:cNvPr id="13" name="Group 12">
-              <a:extLst>
-                <a:ext uri="{FF2B5EF4-FFF2-40B4-BE49-F238E27FC236}">
-                  <a16:creationId xmlns:a16="http://schemas.microsoft.com/office/drawing/2014/main" id="{1326AFC7-7623-4CAA-8490-45E1D65B553C}"/>
-                </a:ext>
-              </a:extLst>
-            </p:cNvPr>
-            <p:cNvGrpSpPr/>
-            <p:nvPr/>
-          </p:nvGrpSpPr>
-          <p:grpSpPr>
-            <a:xfrm>
-              <a:off x="3207720" y="719875"/>
-              <a:ext cx="3438116" cy="6227992"/>
-              <a:chOff x="3424677" y="761487"/>
-              <a:chExt cx="3438116" cy="6227992"/>
-            </a:xfrm>
-          </p:grpSpPr>
-          <p:grpSp>
-            <p:nvGrpSpPr>
-              <p:cNvPr id="11" name="Group 10">
-                <a:extLst>
-                  <a:ext uri="{FF2B5EF4-FFF2-40B4-BE49-F238E27FC236}">
-                    <a16:creationId xmlns:a16="http://schemas.microsoft.com/office/drawing/2014/main" id="{B68F2675-88AD-471E-A5A1-E3FD587848D7}"/>
-                  </a:ext>
-                </a:extLst>
-              </p:cNvPr>
-              <p:cNvGrpSpPr/>
-              <p:nvPr/>
-            </p:nvGrpSpPr>
-            <p:grpSpPr>
-              <a:xfrm>
-                <a:off x="3448855" y="761487"/>
-                <a:ext cx="3413938" cy="6227992"/>
-                <a:chOff x="3448854" y="761487"/>
-                <a:chExt cx="3413938" cy="6227992"/>
-              </a:xfrm>
-            </p:grpSpPr>
-            <p:pic>
-              <p:nvPicPr>
-                <p:cNvPr id="10" name="Picture 9" descr="A picture containing graphical user interface&#10;&#10;Description automatically generated">
-                  <a:extLst>
-                    <a:ext uri="{FF2B5EF4-FFF2-40B4-BE49-F238E27FC236}">
-                      <a16:creationId xmlns:a16="http://schemas.microsoft.com/office/drawing/2014/main" id="{EB2F46B6-B327-4284-B472-0ADF5F798DA3}"/>
-                    </a:ext>
-                  </a:extLst>
-                </p:cNvPr>
-                <p:cNvPicPr>
-                  <a:picLocks noChangeAspect="1"/>
-                </p:cNvPicPr>
-                <p:nvPr/>
-              </p:nvPicPr>
-              <p:blipFill rotWithShape="1">
-                <a:blip r:embed="rId4"/>
-                <a:srcRect l="12148" t="3122" r="5494" b="8176"/>
-                <a:stretch/>
-              </p:blipFill>
-              <p:spPr>
-                <a:xfrm>
-                  <a:off x="3617352" y="761487"/>
-                  <a:ext cx="2852628" cy="6144768"/>
-                </a:xfrm>
-                <a:prstGeom prst="rect">
-                  <a:avLst/>
-                </a:prstGeom>
-              </p:spPr>
-            </p:pic>
-            <p:grpSp>
-              <p:nvGrpSpPr>
-                <p:cNvPr id="14" name="Group 13">
-                  <a:extLst>
-                    <a:ext uri="{FF2B5EF4-FFF2-40B4-BE49-F238E27FC236}">
-                      <a16:creationId xmlns:a16="http://schemas.microsoft.com/office/drawing/2014/main" id="{C71D9C81-2CDC-0845-8F78-2B540C874A74}"/>
-                    </a:ext>
-                  </a:extLst>
-                </p:cNvPr>
-                <p:cNvGrpSpPr/>
-                <p:nvPr/>
-              </p:nvGrpSpPr>
-              <p:grpSpPr>
-                <a:xfrm>
-                  <a:off x="5950005" y="6309037"/>
-                  <a:ext cx="912787" cy="680442"/>
-                  <a:chOff x="5922424" y="6188740"/>
-                  <a:chExt cx="912787" cy="680442"/>
-                </a:xfrm>
-              </p:grpSpPr>
-              <p:pic>
-                <p:nvPicPr>
-                  <p:cNvPr id="15" name="Picture 14">
-                    <a:extLst>
-                      <a:ext uri="{FF2B5EF4-FFF2-40B4-BE49-F238E27FC236}">
-                        <a16:creationId xmlns:a16="http://schemas.microsoft.com/office/drawing/2014/main" id="{734A9B20-B9BE-C048-85BC-4D6865AE6D01}"/>
-                      </a:ext>
-                    </a:extLst>
-                  </p:cNvPr>
-                  <p:cNvPicPr>
-                    <a:picLocks noChangeAspect="1"/>
-                  </p:cNvPicPr>
-                  <p:nvPr/>
-                </p:nvPicPr>
-                <p:blipFill>
-                  <a:blip r:embed="rId5"/>
-                  <a:stretch>
-                    <a:fillRect/>
-                  </a:stretch>
-                </p:blipFill>
-                <p:spPr>
-                  <a:xfrm>
-                    <a:off x="5922424" y="6188740"/>
-                    <a:ext cx="912787" cy="680442"/>
-                  </a:xfrm>
-                  <a:prstGeom prst="rect">
-                    <a:avLst/>
-                  </a:prstGeom>
-                </p:spPr>
-              </p:pic>
-              <p:sp>
-                <p:nvSpPr>
-                  <p:cNvPr id="16" name="Rectangle 15">
-                    <a:extLst>
-                      <a:ext uri="{FF2B5EF4-FFF2-40B4-BE49-F238E27FC236}">
-                        <a16:creationId xmlns:a16="http://schemas.microsoft.com/office/drawing/2014/main" id="{CD6E4E81-4536-F24B-86D6-24D3C0A52C4B}"/>
-                      </a:ext>
-                    </a:extLst>
-                  </p:cNvPr>
-                  <p:cNvSpPr/>
-                  <p:nvPr/>
-                </p:nvSpPr>
-                <p:spPr>
-                  <a:xfrm>
-                    <a:off x="6172419" y="6490907"/>
-                    <a:ext cx="129989" cy="121278"/>
-                  </a:xfrm>
-                  <a:prstGeom prst="rect">
-                    <a:avLst/>
-                  </a:prstGeom>
-                  <a:solidFill>
-                    <a:schemeClr val="bg1"/>
-                  </a:solidFill>
-                  <a:ln>
-                    <a:solidFill>
-                      <a:schemeClr val="bg1"/>
-                    </a:solidFill>
-                  </a:ln>
-                </p:spPr>
-                <p:style>
-                  <a:lnRef idx="2">
-                    <a:schemeClr val="accent1">
-                      <a:shade val="50000"/>
-                    </a:schemeClr>
-                  </a:lnRef>
-                  <a:fillRef idx="1">
-                    <a:schemeClr val="accent1"/>
-                  </a:fillRef>
-                  <a:effectRef idx="0">
-                    <a:schemeClr val="accent1"/>
-                  </a:effectRef>
-                  <a:fontRef idx="minor">
-                    <a:schemeClr val="lt1"/>
-                  </a:fontRef>
-                </p:style>
-                <p:txBody>
-                  <a:bodyPr rtlCol="0" anchor="ctr"/>
-                  <a:lstStyle/>
-                  <a:p>
-                    <a:pPr algn="ctr"/>
-                    <a:r>
-                      <a:rPr lang="en-US" sz="900" dirty="0">
-                        <a:solidFill>
-                          <a:schemeClr val="tx1"/>
-                        </a:solidFill>
-                      </a:rPr>
-                      <a:t>*</a:t>
-                    </a:r>
-                  </a:p>
-                </p:txBody>
-              </p:sp>
-            </p:grpSp>
-            <p:sp>
-              <p:nvSpPr>
-                <p:cNvPr id="18" name="Rectangle 17">
-                  <a:extLst>
-                    <a:ext uri="{FF2B5EF4-FFF2-40B4-BE49-F238E27FC236}">
-                      <a16:creationId xmlns:a16="http://schemas.microsoft.com/office/drawing/2014/main" id="{94D313B5-25D4-4FD4-A0EB-7E2027946522}"/>
-                    </a:ext>
-                  </a:extLst>
-                </p:cNvPr>
-                <p:cNvSpPr/>
-                <p:nvPr/>
-              </p:nvSpPr>
-              <p:spPr>
-                <a:xfrm>
-                  <a:off x="3817486" y="6077293"/>
-                  <a:ext cx="2063499" cy="172347"/>
-                </a:xfrm>
-                <a:prstGeom prst="rect">
-                  <a:avLst/>
-                </a:prstGeom>
-                <a:noFill/>
-                <a:ln>
-                  <a:solidFill>
-                    <a:schemeClr val="tx1"/>
-                  </a:solidFill>
-                </a:ln>
-              </p:spPr>
-              <p:style>
-                <a:lnRef idx="2">
-                  <a:schemeClr val="accent1">
-                    <a:shade val="50000"/>
-                  </a:schemeClr>
-                </a:lnRef>
-                <a:fillRef idx="1">
-                  <a:schemeClr val="accent1"/>
-                </a:fillRef>
-                <a:effectRef idx="0">
-                  <a:schemeClr val="accent1"/>
-                </a:effectRef>
-                <a:fontRef idx="minor">
-                  <a:schemeClr val="lt1"/>
-                </a:fontRef>
-              </p:style>
-              <p:txBody>
-                <a:bodyPr rtlCol="0" anchor="ctr"/>
-                <a:lstStyle/>
-                <a:p>
-                  <a:pPr algn="ctr"/>
-                  <a:endParaRPr lang="en-US" sz="1000" dirty="0">
-                    <a:latin typeface="Helvetica" pitchFamily="2" charset="0"/>
-                  </a:endParaRPr>
-                </a:p>
-              </p:txBody>
-            </p:sp>
-            <p:cxnSp>
-              <p:nvCxnSpPr>
-                <p:cNvPr id="21" name="Straight Connector 20">
-                  <a:extLst>
-                    <a:ext uri="{FF2B5EF4-FFF2-40B4-BE49-F238E27FC236}">
-                      <a16:creationId xmlns:a16="http://schemas.microsoft.com/office/drawing/2014/main" id="{9A39C502-BC8C-45C7-97B1-8E2138FD37A1}"/>
-                    </a:ext>
-                  </a:extLst>
-                </p:cNvPr>
-                <p:cNvCxnSpPr>
-                  <a:cxnSpLocks/>
-                </p:cNvCxnSpPr>
-                <p:nvPr/>
-              </p:nvCxnSpPr>
-              <p:spPr>
-                <a:xfrm>
-                  <a:off x="3617352" y="6077294"/>
-                  <a:ext cx="0" cy="152916"/>
-                </a:xfrm>
-                <a:prstGeom prst="line">
-                  <a:avLst/>
-                </a:prstGeom>
-                <a:ln w="12700">
-                  <a:solidFill>
-                    <a:schemeClr val="tx1"/>
-                  </a:solidFill>
-                </a:ln>
-              </p:spPr>
-              <p:style>
-                <a:lnRef idx="1">
-                  <a:schemeClr val="accent1"/>
-                </a:lnRef>
-                <a:fillRef idx="0">
-                  <a:schemeClr val="accent1"/>
-                </a:fillRef>
-                <a:effectRef idx="0">
-                  <a:schemeClr val="accent1"/>
-                </a:effectRef>
-                <a:fontRef idx="minor">
-                  <a:schemeClr val="tx1"/>
-                </a:fontRef>
-              </p:style>
-            </p:cxnSp>
-            <p:grpSp>
-              <p:nvGrpSpPr>
-                <p:cNvPr id="26" name="Group 25">
-                  <a:extLst>
-                    <a:ext uri="{FF2B5EF4-FFF2-40B4-BE49-F238E27FC236}">
-                      <a16:creationId xmlns:a16="http://schemas.microsoft.com/office/drawing/2014/main" id="{748DDA4F-DFDC-4F15-8E4A-D56A72AD8836}"/>
-                    </a:ext>
-                  </a:extLst>
-                </p:cNvPr>
-                <p:cNvGrpSpPr/>
-                <p:nvPr/>
-              </p:nvGrpSpPr>
-              <p:grpSpPr>
-                <a:xfrm>
-                  <a:off x="3448854" y="1820952"/>
-                  <a:ext cx="2432132" cy="680442"/>
-                  <a:chOff x="971174" y="4885200"/>
-                  <a:chExt cx="2351421" cy="361665"/>
-                </a:xfrm>
-              </p:grpSpPr>
-              <p:sp>
-                <p:nvSpPr>
-                  <p:cNvPr id="28" name="TextBox 27">
-                    <a:extLst>
-                      <a:ext uri="{FF2B5EF4-FFF2-40B4-BE49-F238E27FC236}">
-                        <a16:creationId xmlns:a16="http://schemas.microsoft.com/office/drawing/2014/main" id="{14F97EFB-148F-48D8-A67E-DBF4924CF454}"/>
-                      </a:ext>
-                    </a:extLst>
-                  </p:cNvPr>
-                  <p:cNvSpPr txBox="1"/>
-                  <p:nvPr/>
-                </p:nvSpPr>
-                <p:spPr>
-                  <a:xfrm rot="16200000">
-                    <a:off x="898063" y="4958311"/>
-                    <a:ext cx="361665" cy="215444"/>
-                  </a:xfrm>
-                  <a:prstGeom prst="rect">
-                    <a:avLst/>
-                  </a:prstGeom>
-                  <a:noFill/>
-                </p:spPr>
-                <p:txBody>
-                  <a:bodyPr wrap="square" rtlCol="0">
-                    <a:spAutoFit/>
-                  </a:bodyPr>
-                  <a:lstStyle/>
-                  <a:p>
-                    <a:r>
-                      <a:rPr lang="en-US" sz="800" dirty="0">
-                        <a:latin typeface="Helvetica" pitchFamily="2" charset="0"/>
-                      </a:rPr>
-                      <a:t>SCBI</a:t>
-                    </a:r>
-                  </a:p>
-                </p:txBody>
-              </p:sp>
-              <p:sp>
-                <p:nvSpPr>
-                  <p:cNvPr id="29" name="Rectangle 28">
-                    <a:extLst>
-                      <a:ext uri="{FF2B5EF4-FFF2-40B4-BE49-F238E27FC236}">
-                        <a16:creationId xmlns:a16="http://schemas.microsoft.com/office/drawing/2014/main" id="{E78B84E7-3CF5-40B1-8099-7777BCDF812C}"/>
-                      </a:ext>
-                    </a:extLst>
-                  </p:cNvPr>
-                  <p:cNvSpPr/>
-                  <p:nvPr/>
-                </p:nvSpPr>
-                <p:spPr>
-                  <a:xfrm>
-                    <a:off x="1334079" y="5084485"/>
-                    <a:ext cx="1988516" cy="78979"/>
-                  </a:xfrm>
-                  <a:prstGeom prst="rect">
-                    <a:avLst/>
-                  </a:prstGeom>
-                  <a:noFill/>
-                  <a:ln>
-                    <a:solidFill>
-                      <a:schemeClr val="tx1"/>
-                    </a:solidFill>
-                  </a:ln>
-                </p:spPr>
-                <p:style>
-                  <a:lnRef idx="2">
-                    <a:schemeClr val="accent1">
-                      <a:shade val="50000"/>
-                    </a:schemeClr>
-                  </a:lnRef>
-                  <a:fillRef idx="1">
-                    <a:schemeClr val="accent1"/>
-                  </a:fillRef>
-                  <a:effectRef idx="0">
-                    <a:schemeClr val="accent1"/>
-                  </a:effectRef>
-                  <a:fontRef idx="minor">
-                    <a:schemeClr val="lt1"/>
-                  </a:fontRef>
-                </p:style>
-                <p:txBody>
-                  <a:bodyPr rtlCol="0" anchor="ctr"/>
-                  <a:lstStyle/>
-                  <a:p>
-                    <a:pPr algn="ctr"/>
-                    <a:endParaRPr lang="en-US" sz="1000">
-                      <a:latin typeface="Helvetica" pitchFamily="2" charset="0"/>
-                    </a:endParaRPr>
-                  </a:p>
-                </p:txBody>
-              </p:sp>
-              <p:cxnSp>
-                <p:nvCxnSpPr>
-                  <p:cNvPr id="30" name="Straight Connector 29">
-                    <a:extLst>
-                      <a:ext uri="{FF2B5EF4-FFF2-40B4-BE49-F238E27FC236}">
-                        <a16:creationId xmlns:a16="http://schemas.microsoft.com/office/drawing/2014/main" id="{9AEA6C40-AA50-4404-8556-DAFD5BFF4747}"/>
-                      </a:ext>
-                    </a:extLst>
-                  </p:cNvPr>
-                  <p:cNvCxnSpPr>
-                    <a:cxnSpLocks/>
-                  </p:cNvCxnSpPr>
-                  <p:nvPr/>
-                </p:nvCxnSpPr>
-                <p:spPr>
-                  <a:xfrm>
-                    <a:off x="1149593" y="5073500"/>
-                    <a:ext cx="5129" cy="100949"/>
-                  </a:xfrm>
-                  <a:prstGeom prst="line">
-                    <a:avLst/>
-                  </a:prstGeom>
-                  <a:ln w="12700">
-                    <a:solidFill>
-                      <a:schemeClr val="tx1"/>
-                    </a:solidFill>
-                  </a:ln>
-                </p:spPr>
-                <p:style>
-                  <a:lnRef idx="1">
-                    <a:schemeClr val="accent1"/>
-                  </a:lnRef>
-                  <a:fillRef idx="0">
-                    <a:schemeClr val="accent1"/>
-                  </a:fillRef>
-                  <a:effectRef idx="0">
-                    <a:schemeClr val="accent1"/>
-                  </a:effectRef>
-                  <a:fontRef idx="minor">
-                    <a:schemeClr val="tx1"/>
-                  </a:fontRef>
-                </p:style>
-              </p:cxnSp>
-            </p:grpSp>
-          </p:grpSp>
-          <p:sp>
-            <p:nvSpPr>
-              <p:cNvPr id="33" name="TextBox 32">
-                <a:extLst>
-                  <a:ext uri="{FF2B5EF4-FFF2-40B4-BE49-F238E27FC236}">
-                    <a16:creationId xmlns:a16="http://schemas.microsoft.com/office/drawing/2014/main" id="{55E6B07D-1202-47E5-8A17-9DDDF5CE9668}"/>
-                  </a:ext>
-                </a:extLst>
-              </p:cNvPr>
-              <p:cNvSpPr txBox="1"/>
-              <p:nvPr/>
-            </p:nvSpPr>
-            <p:spPr>
-              <a:xfrm rot="16200000">
-                <a:off x="3351566" y="6020484"/>
-                <a:ext cx="361665" cy="215444"/>
-              </a:xfrm>
-              <a:prstGeom prst="rect">
-                <a:avLst/>
-              </a:prstGeom>
-              <a:noFill/>
-            </p:spPr>
-            <p:txBody>
-              <a:bodyPr wrap="square" rtlCol="0">
-                <a:spAutoFit/>
-              </a:bodyPr>
-              <a:lstStyle/>
-              <a:p>
-                <a:r>
-                  <a:rPr lang="en-US" sz="800" dirty="0">
-                    <a:latin typeface="Helvetica" pitchFamily="2" charset="0"/>
-                  </a:rPr>
-                  <a:t>HF</a:t>
-                </a:r>
-              </a:p>
-            </p:txBody>
-          </p:sp>
-        </p:grpSp>
       </p:grpSp>
+      <p:sp>
+        <p:nvSpPr>
+          <p:cNvPr id="33" name="TextBox 32">
+            <a:extLst>
+              <a:ext uri="{FF2B5EF4-FFF2-40B4-BE49-F238E27FC236}">
+                <a16:creationId xmlns:a16="http://schemas.microsoft.com/office/drawing/2014/main" id="{55E6B07D-1202-47E5-8A17-9DDDF5CE9668}"/>
+              </a:ext>
+            </a:extLst>
+          </p:cNvPr>
+          <p:cNvSpPr txBox="1"/>
+          <p:nvPr/>
+        </p:nvSpPr>
+        <p:spPr>
+          <a:xfrm rot="16200000">
+            <a:off x="3130641" y="5938424"/>
+            <a:ext cx="361665" cy="215444"/>
+          </a:xfrm>
+          <a:prstGeom prst="rect">
+            <a:avLst/>
+          </a:prstGeom>
+          <a:noFill/>
+        </p:spPr>
+        <p:txBody>
+          <a:bodyPr wrap="square" rtlCol="0">
+            <a:spAutoFit/>
+          </a:bodyPr>
+          <a:lstStyle/>
+          <a:p>
+            <a:r>
+              <a:rPr lang="en-US" sz="800" dirty="0">
+                <a:latin typeface="Helvetica" pitchFamily="2" charset="0"/>
+              </a:rPr>
+              <a:t>HF</a:t>
+            </a:r>
+          </a:p>
+        </p:txBody>
+      </p:sp>
     </p:spTree>
     <p:extLst>
       <p:ext uri="{BB962C8B-B14F-4D97-AF65-F5344CB8AC3E}">

</xml_diff>

<commit_message>
(re-)produced tree-ring figures from .pptx file
@camerondow35 , FYI
</commit_message>
<xml_diff>
--- a/doc/manuscript/tables_figures/tree_rings_figs.pptx
+++ b/doc/manuscript/tables_figures/tree_rings_figs.pptx
@@ -199,7 +199,7 @@
           <a:p>
             <a:fld id="{F70F5402-B2D4-AF48-9284-8FD064B6E26D}" type="datetimeFigureOut">
               <a:rPr lang="en-US" smtClean="0"/>
-              <a:t>10/16/2021</a:t>
+              <a:t>10/20/21</a:t>
             </a:fld>
             <a:endParaRPr lang="en-US"/>
           </a:p>
@@ -773,7 +773,7 @@
           <a:p>
             <a:fld id="{7323833B-5180-444D-893E-57F1CEBFA0E4}" type="datetimeFigureOut">
               <a:rPr lang="en-US" smtClean="0"/>
-              <a:t>10/16/2021</a:t>
+              <a:t>10/20/21</a:t>
             </a:fld>
             <a:endParaRPr lang="en-US"/>
           </a:p>
@@ -943,7 +943,7 @@
           <a:p>
             <a:fld id="{7323833B-5180-444D-893E-57F1CEBFA0E4}" type="datetimeFigureOut">
               <a:rPr lang="en-US" smtClean="0"/>
-              <a:t>10/16/2021</a:t>
+              <a:t>10/20/21</a:t>
             </a:fld>
             <a:endParaRPr lang="en-US"/>
           </a:p>
@@ -1123,7 +1123,7 @@
           <a:p>
             <a:fld id="{7323833B-5180-444D-893E-57F1CEBFA0E4}" type="datetimeFigureOut">
               <a:rPr lang="en-US" smtClean="0"/>
-              <a:t>10/16/2021</a:t>
+              <a:t>10/20/21</a:t>
             </a:fld>
             <a:endParaRPr lang="en-US"/>
           </a:p>
@@ -1293,7 +1293,7 @@
           <a:p>
             <a:fld id="{7323833B-5180-444D-893E-57F1CEBFA0E4}" type="datetimeFigureOut">
               <a:rPr lang="en-US" smtClean="0"/>
-              <a:t>10/16/2021</a:t>
+              <a:t>10/20/21</a:t>
             </a:fld>
             <a:endParaRPr lang="en-US"/>
           </a:p>
@@ -1537,7 +1537,7 @@
           <a:p>
             <a:fld id="{7323833B-5180-444D-893E-57F1CEBFA0E4}" type="datetimeFigureOut">
               <a:rPr lang="en-US" smtClean="0"/>
-              <a:t>10/16/2021</a:t>
+              <a:t>10/20/21</a:t>
             </a:fld>
             <a:endParaRPr lang="en-US"/>
           </a:p>
@@ -1769,7 +1769,7 @@
           <a:p>
             <a:fld id="{7323833B-5180-444D-893E-57F1CEBFA0E4}" type="datetimeFigureOut">
               <a:rPr lang="en-US" smtClean="0"/>
-              <a:t>10/16/2021</a:t>
+              <a:t>10/20/21</a:t>
             </a:fld>
             <a:endParaRPr lang="en-US"/>
           </a:p>
@@ -2136,7 +2136,7 @@
           <a:p>
             <a:fld id="{7323833B-5180-444D-893E-57F1CEBFA0E4}" type="datetimeFigureOut">
               <a:rPr lang="en-US" smtClean="0"/>
-              <a:t>10/16/2021</a:t>
+              <a:t>10/20/21</a:t>
             </a:fld>
             <a:endParaRPr lang="en-US"/>
           </a:p>
@@ -2254,7 +2254,7 @@
           <a:p>
             <a:fld id="{7323833B-5180-444D-893E-57F1CEBFA0E4}" type="datetimeFigureOut">
               <a:rPr lang="en-US" smtClean="0"/>
-              <a:t>10/16/2021</a:t>
+              <a:t>10/20/21</a:t>
             </a:fld>
             <a:endParaRPr lang="en-US"/>
           </a:p>
@@ -2349,7 +2349,7 @@
           <a:p>
             <a:fld id="{7323833B-5180-444D-893E-57F1CEBFA0E4}" type="datetimeFigureOut">
               <a:rPr lang="en-US" smtClean="0"/>
-              <a:t>10/16/2021</a:t>
+              <a:t>10/20/21</a:t>
             </a:fld>
             <a:endParaRPr lang="en-US"/>
           </a:p>
@@ -2626,7 +2626,7 @@
           <a:p>
             <a:fld id="{7323833B-5180-444D-893E-57F1CEBFA0E4}" type="datetimeFigureOut">
               <a:rPr lang="en-US" smtClean="0"/>
-              <a:t>10/16/2021</a:t>
+              <a:t>10/20/21</a:t>
             </a:fld>
             <a:endParaRPr lang="en-US"/>
           </a:p>
@@ -2883,7 +2883,7 @@
           <a:p>
             <a:fld id="{7323833B-5180-444D-893E-57F1CEBFA0E4}" type="datetimeFigureOut">
               <a:rPr lang="en-US" smtClean="0"/>
-              <a:t>10/16/2021</a:t>
+              <a:t>10/20/21</a:t>
             </a:fld>
             <a:endParaRPr lang="en-US"/>
           </a:p>
@@ -3096,7 +3096,7 @@
           <a:p>
             <a:fld id="{7323833B-5180-444D-893E-57F1CEBFA0E4}" type="datetimeFigureOut">
               <a:rPr lang="en-US" smtClean="0"/>
-              <a:t>10/16/2021</a:t>
+              <a:t>10/20/21</a:t>
             </a:fld>
             <a:endParaRPr lang="en-US"/>
           </a:p>

</xml_diff>